<commit_message>
Added scripts for solutions to SQL.1-4 exercises.
Also, expected results from queries can now be found in the exercise texts.
</commit_message>
<xml_diff>
--- a/Chap/DB/Presentations/DBQueryMT.pptx
+++ b/Chap/DB/Presentations/DBQueryMT.pptx
@@ -266,7 +266,7 @@
           <a:p>
             <a:fld id="{E15B7D8E-2A20-4C0E-991C-872DBB7459A8}" type="datetimeFigureOut">
               <a:rPr lang="da-DK" smtClean="0"/>
-              <a:t>29-09-2018</a:t>
+              <a:t>05-10-2018</a:t>
             </a:fld>
             <a:endParaRPr lang="da-DK"/>
           </a:p>
@@ -436,7 +436,7 @@
           <a:p>
             <a:fld id="{E15B7D8E-2A20-4C0E-991C-872DBB7459A8}" type="datetimeFigureOut">
               <a:rPr lang="da-DK" smtClean="0"/>
-              <a:t>29-09-2018</a:t>
+              <a:t>05-10-2018</a:t>
             </a:fld>
             <a:endParaRPr lang="da-DK"/>
           </a:p>
@@ -616,7 +616,7 @@
           <a:p>
             <a:fld id="{E15B7D8E-2A20-4C0E-991C-872DBB7459A8}" type="datetimeFigureOut">
               <a:rPr lang="da-DK" smtClean="0"/>
-              <a:t>29-09-2018</a:t>
+              <a:t>05-10-2018</a:t>
             </a:fld>
             <a:endParaRPr lang="da-DK"/>
           </a:p>
@@ -786,7 +786,7 @@
           <a:p>
             <a:fld id="{E15B7D8E-2A20-4C0E-991C-872DBB7459A8}" type="datetimeFigureOut">
               <a:rPr lang="da-DK" smtClean="0"/>
-              <a:t>29-09-2018</a:t>
+              <a:t>05-10-2018</a:t>
             </a:fld>
             <a:endParaRPr lang="da-DK"/>
           </a:p>
@@ -1032,7 +1032,7 @@
           <a:p>
             <a:fld id="{E15B7D8E-2A20-4C0E-991C-872DBB7459A8}" type="datetimeFigureOut">
               <a:rPr lang="da-DK" smtClean="0"/>
-              <a:t>29-09-2018</a:t>
+              <a:t>05-10-2018</a:t>
             </a:fld>
             <a:endParaRPr lang="da-DK"/>
           </a:p>
@@ -1264,7 +1264,7 @@
           <a:p>
             <a:fld id="{E15B7D8E-2A20-4C0E-991C-872DBB7459A8}" type="datetimeFigureOut">
               <a:rPr lang="da-DK" smtClean="0"/>
-              <a:t>29-09-2018</a:t>
+              <a:t>05-10-2018</a:t>
             </a:fld>
             <a:endParaRPr lang="da-DK"/>
           </a:p>
@@ -1631,7 +1631,7 @@
           <a:p>
             <a:fld id="{E15B7D8E-2A20-4C0E-991C-872DBB7459A8}" type="datetimeFigureOut">
               <a:rPr lang="da-DK" smtClean="0"/>
-              <a:t>29-09-2018</a:t>
+              <a:t>05-10-2018</a:t>
             </a:fld>
             <a:endParaRPr lang="da-DK"/>
           </a:p>
@@ -1749,7 +1749,7 @@
           <a:p>
             <a:fld id="{E15B7D8E-2A20-4C0E-991C-872DBB7459A8}" type="datetimeFigureOut">
               <a:rPr lang="da-DK" smtClean="0"/>
-              <a:t>29-09-2018</a:t>
+              <a:t>05-10-2018</a:t>
             </a:fld>
             <a:endParaRPr lang="da-DK"/>
           </a:p>
@@ -1844,7 +1844,7 @@
           <a:p>
             <a:fld id="{E15B7D8E-2A20-4C0E-991C-872DBB7459A8}" type="datetimeFigureOut">
               <a:rPr lang="da-DK" smtClean="0"/>
-              <a:t>29-09-2018</a:t>
+              <a:t>05-10-2018</a:t>
             </a:fld>
             <a:endParaRPr lang="da-DK"/>
           </a:p>
@@ -2121,7 +2121,7 @@
           <a:p>
             <a:fld id="{E15B7D8E-2A20-4C0E-991C-872DBB7459A8}" type="datetimeFigureOut">
               <a:rPr lang="da-DK" smtClean="0"/>
-              <a:t>29-09-2018</a:t>
+              <a:t>05-10-2018</a:t>
             </a:fld>
             <a:endParaRPr lang="da-DK"/>
           </a:p>
@@ -2374,7 +2374,7 @@
           <a:p>
             <a:fld id="{E15B7D8E-2A20-4C0E-991C-872DBB7459A8}" type="datetimeFigureOut">
               <a:rPr lang="da-DK" smtClean="0"/>
-              <a:t>29-09-2018</a:t>
+              <a:t>05-10-2018</a:t>
             </a:fld>
             <a:endParaRPr lang="da-DK"/>
           </a:p>
@@ -2587,7 +2587,7 @@
           <a:p>
             <a:fld id="{E15B7D8E-2A20-4C0E-991C-872DBB7459A8}" type="datetimeFigureOut">
               <a:rPr lang="da-DK" smtClean="0"/>
-              <a:t>29-09-2018</a:t>
+              <a:t>05-10-2018</a:t>
             </a:fld>
             <a:endParaRPr lang="da-DK"/>
           </a:p>
@@ -5334,7 +5334,7 @@
           <p:nvPr>
             <p:extLst>
               <p:ext uri="{D42A27DB-BD31-4B8C-83A1-F6EECF244321}">
-                <p14:modId xmlns:p14="http://schemas.microsoft.com/office/powerpoint/2010/main" val="250914917"/>
+                <p14:modId xmlns:p14="http://schemas.microsoft.com/office/powerpoint/2010/main" val="2586331151"/>
               </p:ext>
             </p:extLst>
           </p:nvPr>
@@ -5503,6 +5503,11 @@
                           <a:ln>
                             <a:noFill/>
                           </a:ln>
+                          <a:solidFill>
+                            <a:schemeClr val="bg2">
+                              <a:lumMod val="50000"/>
+                            </a:schemeClr>
+                          </a:solidFill>
                           <a:effectLst/>
                         </a:rPr>
                         <a:t>RowB1</a:t>
@@ -5512,7 +5517,9 @@
                           <a:noFill/>
                         </a:ln>
                         <a:solidFill>
-                          <a:schemeClr val="tx1"/>
+                          <a:schemeClr val="bg2">
+                            <a:lumMod val="50000"/>
+                          </a:schemeClr>
                         </a:solidFill>
                         <a:effectLst/>
                         <a:latin typeface="+mn-lt"/>
@@ -5663,6 +5670,11 @@
                           <a:ln>
                             <a:noFill/>
                           </a:ln>
+                          <a:solidFill>
+                            <a:schemeClr val="bg2">
+                              <a:lumMod val="50000"/>
+                            </a:schemeClr>
+                          </a:solidFill>
                           <a:effectLst/>
                         </a:rPr>
                         <a:t>RowB2</a:t>
@@ -5672,7 +5684,9 @@
                           <a:noFill/>
                         </a:ln>
                         <a:solidFill>
-                          <a:schemeClr val="tx1"/>
+                          <a:schemeClr val="bg2">
+                            <a:lumMod val="50000"/>
+                          </a:schemeClr>
                         </a:solidFill>
                         <a:effectLst/>
                         <a:latin typeface="+mn-lt"/>
@@ -5761,6 +5775,11 @@
                           <a:ln>
                             <a:noFill/>
                           </a:ln>
+                          <a:solidFill>
+                            <a:schemeClr val="bg2">
+                              <a:lumMod val="50000"/>
+                            </a:schemeClr>
+                          </a:solidFill>
                           <a:effectLst/>
                         </a:rPr>
                         <a:t>RowB3</a:t>
@@ -5770,7 +5789,9 @@
                           <a:noFill/>
                         </a:ln>
                         <a:solidFill>
-                          <a:schemeClr val="tx1"/>
+                          <a:schemeClr val="bg2">
+                            <a:lumMod val="50000"/>
+                          </a:schemeClr>
                         </a:solidFill>
                         <a:effectLst/>
                         <a:latin typeface="+mn-lt"/>
@@ -5859,6 +5880,11 @@
                           <a:ln>
                             <a:noFill/>
                           </a:ln>
+                          <a:solidFill>
+                            <a:schemeClr val="bg2">
+                              <a:lumMod val="50000"/>
+                            </a:schemeClr>
+                          </a:solidFill>
                           <a:effectLst/>
                         </a:rPr>
                         <a:t>RowB4</a:t>
@@ -5868,7 +5894,9 @@
                           <a:noFill/>
                         </a:ln>
                         <a:solidFill>
-                          <a:schemeClr val="tx1"/>
+                          <a:schemeClr val="bg2">
+                            <a:lumMod val="50000"/>
+                          </a:schemeClr>
                         </a:solidFill>
                         <a:effectLst/>
                         <a:latin typeface="+mn-lt"/>
@@ -6065,7 +6093,7 @@
           <p:nvPr>
             <p:extLst>
               <p:ext uri="{D42A27DB-BD31-4B8C-83A1-F6EECF244321}">
-                <p14:modId xmlns:p14="http://schemas.microsoft.com/office/powerpoint/2010/main" val="2665803186"/>
+                <p14:modId xmlns:p14="http://schemas.microsoft.com/office/powerpoint/2010/main" val="1718786492"/>
               </p:ext>
             </p:extLst>
           </p:nvPr>
@@ -6645,6 +6673,11 @@
                           <a:ln>
                             <a:noFill/>
                           </a:ln>
+                          <a:solidFill>
+                            <a:schemeClr val="bg2">
+                              <a:lumMod val="50000"/>
+                            </a:schemeClr>
+                          </a:solidFill>
                           <a:effectLst/>
                         </a:rPr>
                         <a:t>RowB1</a:t>
@@ -6654,7 +6687,9 @@
                           <a:noFill/>
                         </a:ln>
                         <a:solidFill>
-                          <a:schemeClr val="tx1"/>
+                          <a:schemeClr val="bg2">
+                            <a:lumMod val="50000"/>
+                          </a:schemeClr>
                         </a:solidFill>
                         <a:effectLst/>
                         <a:latin typeface="+mn-lt"/>
@@ -7034,6 +7069,11 @@
                           <a:ln>
                             <a:noFill/>
                           </a:ln>
+                          <a:solidFill>
+                            <a:schemeClr val="bg2">
+                              <a:lumMod val="50000"/>
+                            </a:schemeClr>
+                          </a:solidFill>
                           <a:effectLst/>
                         </a:rPr>
                         <a:t>RowB2</a:t>
@@ -7043,7 +7083,9 @@
                           <a:noFill/>
                         </a:ln>
                         <a:solidFill>
-                          <a:schemeClr val="tx1"/>
+                          <a:schemeClr val="bg2">
+                            <a:lumMod val="50000"/>
+                          </a:schemeClr>
                         </a:solidFill>
                         <a:effectLst/>
                         <a:latin typeface="+mn-lt"/>
@@ -7299,6 +7341,11 @@
                           <a:ln>
                             <a:noFill/>
                           </a:ln>
+                          <a:solidFill>
+                            <a:schemeClr val="bg2">
+                              <a:lumMod val="50000"/>
+                            </a:schemeClr>
+                          </a:solidFill>
                           <a:effectLst/>
                         </a:rPr>
                         <a:t>RowB1</a:t>
@@ -7308,7 +7355,9 @@
                           <a:noFill/>
                         </a:ln>
                         <a:solidFill>
-                          <a:schemeClr val="tx1"/>
+                          <a:schemeClr val="bg2">
+                            <a:lumMod val="50000"/>
+                          </a:schemeClr>
                         </a:solidFill>
                         <a:effectLst/>
                         <a:latin typeface="+mn-lt"/>
@@ -7564,6 +7613,11 @@
                           <a:ln>
                             <a:noFill/>
                           </a:ln>
+                          <a:solidFill>
+                            <a:schemeClr val="bg2">
+                              <a:lumMod val="50000"/>
+                            </a:schemeClr>
+                          </a:solidFill>
                           <a:effectLst/>
                         </a:rPr>
                         <a:t>RowB2</a:t>
@@ -7573,7 +7627,9 @@
                           <a:noFill/>
                         </a:ln>
                         <a:solidFill>
-                          <a:schemeClr val="tx1"/>
+                          <a:schemeClr val="bg2">
+                            <a:lumMod val="50000"/>
+                          </a:schemeClr>
                         </a:solidFill>
                         <a:effectLst/>
                         <a:latin typeface="+mn-lt"/>
@@ -7829,6 +7885,11 @@
                           <a:ln>
                             <a:noFill/>
                           </a:ln>
+                          <a:solidFill>
+                            <a:schemeClr val="bg2">
+                              <a:lumMod val="50000"/>
+                            </a:schemeClr>
+                          </a:solidFill>
                           <a:effectLst/>
                         </a:rPr>
                         <a:t>RowB1</a:t>
@@ -7838,7 +7899,9 @@
                           <a:noFill/>
                         </a:ln>
                         <a:solidFill>
-                          <a:schemeClr val="tx1"/>
+                          <a:schemeClr val="bg2">
+                            <a:lumMod val="50000"/>
+                          </a:schemeClr>
                         </a:solidFill>
                         <a:effectLst/>
                         <a:latin typeface="+mn-lt"/>
@@ -8094,6 +8157,11 @@
                           <a:ln>
                             <a:noFill/>
                           </a:ln>
+                          <a:solidFill>
+                            <a:schemeClr val="bg2">
+                              <a:lumMod val="50000"/>
+                            </a:schemeClr>
+                          </a:solidFill>
                           <a:effectLst/>
                         </a:rPr>
                         <a:t>RowB2</a:t>
@@ -8103,7 +8171,9 @@
                           <a:noFill/>
                         </a:ln>
                         <a:solidFill>
-                          <a:schemeClr val="tx1"/>
+                          <a:schemeClr val="bg2">
+                            <a:lumMod val="50000"/>
+                          </a:schemeClr>
                         </a:solidFill>
                         <a:effectLst/>
                         <a:latin typeface="+mn-lt"/>
@@ -8359,6 +8429,11 @@
                           <a:ln>
                             <a:noFill/>
                           </a:ln>
+                          <a:solidFill>
+                            <a:schemeClr val="bg2">
+                              <a:lumMod val="50000"/>
+                            </a:schemeClr>
+                          </a:solidFill>
                           <a:effectLst/>
                         </a:rPr>
                         <a:t>RowB1</a:t>
@@ -8368,7 +8443,9 @@
                           <a:noFill/>
                         </a:ln>
                         <a:solidFill>
-                          <a:schemeClr val="tx1"/>
+                          <a:schemeClr val="bg2">
+                            <a:lumMod val="50000"/>
+                          </a:schemeClr>
                         </a:solidFill>
                         <a:effectLst/>
                         <a:latin typeface="+mn-lt"/>
@@ -8624,6 +8701,11 @@
                           <a:ln>
                             <a:noFill/>
                           </a:ln>
+                          <a:solidFill>
+                            <a:schemeClr val="bg2">
+                              <a:lumMod val="50000"/>
+                            </a:schemeClr>
+                          </a:solidFill>
                           <a:effectLst/>
                         </a:rPr>
                         <a:t>RowB2</a:t>
@@ -8633,7 +8715,9 @@
                           <a:noFill/>
                         </a:ln>
                         <a:solidFill>
-                          <a:schemeClr val="tx1"/>
+                          <a:schemeClr val="bg2">
+                            <a:lumMod val="50000"/>
+                          </a:schemeClr>
                         </a:solidFill>
                         <a:effectLst/>
                         <a:latin typeface="+mn-lt"/>
@@ -9854,7 +9938,7 @@
           <p:nvPr>
             <p:extLst>
               <p:ext uri="{D42A27DB-BD31-4B8C-83A1-F6EECF244321}">
-                <p14:modId xmlns:p14="http://schemas.microsoft.com/office/powerpoint/2010/main" val="3173734065"/>
+                <p14:modId xmlns:p14="http://schemas.microsoft.com/office/powerpoint/2010/main" val="524876479"/>
               </p:ext>
             </p:extLst>
           </p:nvPr>
@@ -10023,6 +10107,11 @@
                           <a:ln>
                             <a:noFill/>
                           </a:ln>
+                          <a:solidFill>
+                            <a:schemeClr val="bg2">
+                              <a:lumMod val="50000"/>
+                            </a:schemeClr>
+                          </a:solidFill>
                           <a:effectLst/>
                         </a:rPr>
                         <a:t>RowB1</a:t>
@@ -10032,7 +10121,9 @@
                           <a:noFill/>
                         </a:ln>
                         <a:solidFill>
-                          <a:schemeClr val="tx1"/>
+                          <a:schemeClr val="bg2">
+                            <a:lumMod val="50000"/>
+                          </a:schemeClr>
                         </a:solidFill>
                         <a:effectLst/>
                         <a:latin typeface="+mn-lt"/>
@@ -10183,6 +10274,11 @@
                           <a:ln>
                             <a:noFill/>
                           </a:ln>
+                          <a:solidFill>
+                            <a:schemeClr val="bg2">
+                              <a:lumMod val="50000"/>
+                            </a:schemeClr>
+                          </a:solidFill>
                           <a:effectLst/>
                         </a:rPr>
                         <a:t>RowB2</a:t>
@@ -10192,7 +10288,9 @@
                           <a:noFill/>
                         </a:ln>
                         <a:solidFill>
-                          <a:schemeClr val="tx1"/>
+                          <a:schemeClr val="bg2">
+                            <a:lumMod val="50000"/>
+                          </a:schemeClr>
                         </a:solidFill>
                         <a:effectLst/>
                         <a:latin typeface="+mn-lt"/>
@@ -10281,6 +10379,11 @@
                           <a:ln>
                             <a:noFill/>
                           </a:ln>
+                          <a:solidFill>
+                            <a:schemeClr val="bg2">
+                              <a:lumMod val="50000"/>
+                            </a:schemeClr>
+                          </a:solidFill>
                           <a:effectLst/>
                         </a:rPr>
                         <a:t>RowB3</a:t>
@@ -10290,7 +10393,9 @@
                           <a:noFill/>
                         </a:ln>
                         <a:solidFill>
-                          <a:schemeClr val="tx1"/>
+                          <a:schemeClr val="bg2">
+                            <a:lumMod val="50000"/>
+                          </a:schemeClr>
                         </a:solidFill>
                         <a:effectLst/>
                         <a:latin typeface="+mn-lt"/>
@@ -10379,6 +10484,11 @@
                           <a:ln>
                             <a:noFill/>
                           </a:ln>
+                          <a:solidFill>
+                            <a:schemeClr val="bg2">
+                              <a:lumMod val="50000"/>
+                            </a:schemeClr>
+                          </a:solidFill>
                           <a:effectLst/>
                         </a:rPr>
                         <a:t>RowB4</a:t>
@@ -10388,7 +10498,9 @@
                           <a:noFill/>
                         </a:ln>
                         <a:solidFill>
-                          <a:schemeClr val="tx1"/>
+                          <a:schemeClr val="bg2">
+                            <a:lumMod val="50000"/>
+                          </a:schemeClr>
                         </a:solidFill>
                         <a:effectLst/>
                         <a:latin typeface="+mn-lt"/>
@@ -10525,7 +10637,7 @@
           <p:nvPr>
             <p:extLst>
               <p:ext uri="{D42A27DB-BD31-4B8C-83A1-F6EECF244321}">
-                <p14:modId xmlns:p14="http://schemas.microsoft.com/office/powerpoint/2010/main" val="3178186583"/>
+                <p14:modId xmlns:p14="http://schemas.microsoft.com/office/powerpoint/2010/main" val="3328933007"/>
               </p:ext>
             </p:extLst>
           </p:nvPr>
@@ -11105,6 +11217,11 @@
                           <a:ln>
                             <a:noFill/>
                           </a:ln>
+                          <a:solidFill>
+                            <a:schemeClr val="bg2">
+                              <a:lumMod val="50000"/>
+                            </a:schemeClr>
+                          </a:solidFill>
                           <a:effectLst/>
                         </a:rPr>
                         <a:t>RowB1</a:t>
@@ -11114,7 +11231,9 @@
                           <a:noFill/>
                         </a:ln>
                         <a:solidFill>
-                          <a:schemeClr val="tx1"/>
+                          <a:schemeClr val="bg2">
+                            <a:lumMod val="50000"/>
+                          </a:schemeClr>
                         </a:solidFill>
                         <a:effectLst/>
                         <a:latin typeface="+mn-lt"/>
@@ -11494,6 +11613,11 @@
                           <a:ln>
                             <a:noFill/>
                           </a:ln>
+                          <a:solidFill>
+                            <a:schemeClr val="bg2">
+                              <a:lumMod val="50000"/>
+                            </a:schemeClr>
+                          </a:solidFill>
                           <a:effectLst/>
                         </a:rPr>
                         <a:t>RowB2</a:t>
@@ -11503,7 +11627,9 @@
                           <a:noFill/>
                         </a:ln>
                         <a:solidFill>
-                          <a:schemeClr val="tx1"/>
+                          <a:schemeClr val="bg2">
+                            <a:lumMod val="50000"/>
+                          </a:schemeClr>
                         </a:solidFill>
                         <a:effectLst/>
                         <a:latin typeface="+mn-lt"/>
@@ -11759,6 +11885,11 @@
                           <a:ln>
                             <a:noFill/>
                           </a:ln>
+                          <a:solidFill>
+                            <a:schemeClr val="bg2">
+                              <a:lumMod val="50000"/>
+                            </a:schemeClr>
+                          </a:solidFill>
                           <a:effectLst/>
                         </a:rPr>
                         <a:t>RowB1</a:t>
@@ -11768,7 +11899,9 @@
                           <a:noFill/>
                         </a:ln>
                         <a:solidFill>
-                          <a:schemeClr val="tx1"/>
+                          <a:schemeClr val="bg2">
+                            <a:lumMod val="50000"/>
+                          </a:schemeClr>
                         </a:solidFill>
                         <a:effectLst/>
                         <a:latin typeface="+mn-lt"/>
@@ -12024,6 +12157,11 @@
                           <a:ln>
                             <a:noFill/>
                           </a:ln>
+                          <a:solidFill>
+                            <a:schemeClr val="bg2">
+                              <a:lumMod val="50000"/>
+                            </a:schemeClr>
+                          </a:solidFill>
                           <a:effectLst/>
                         </a:rPr>
                         <a:t>RowB2</a:t>
@@ -12033,7 +12171,9 @@
                           <a:noFill/>
                         </a:ln>
                         <a:solidFill>
-                          <a:schemeClr val="tx1"/>
+                          <a:schemeClr val="bg2">
+                            <a:lumMod val="50000"/>
+                          </a:schemeClr>
                         </a:solidFill>
                         <a:effectLst/>
                         <a:latin typeface="+mn-lt"/>
@@ -12289,6 +12429,11 @@
                           <a:ln>
                             <a:noFill/>
                           </a:ln>
+                          <a:solidFill>
+                            <a:schemeClr val="bg2">
+                              <a:lumMod val="50000"/>
+                            </a:schemeClr>
+                          </a:solidFill>
                           <a:effectLst/>
                         </a:rPr>
                         <a:t>RowB1</a:t>
@@ -12298,7 +12443,9 @@
                           <a:noFill/>
                         </a:ln>
                         <a:solidFill>
-                          <a:schemeClr val="tx1"/>
+                          <a:schemeClr val="bg2">
+                            <a:lumMod val="50000"/>
+                          </a:schemeClr>
                         </a:solidFill>
                         <a:effectLst/>
                         <a:latin typeface="+mn-lt"/>
@@ -12554,6 +12701,11 @@
                           <a:ln>
                             <a:noFill/>
                           </a:ln>
+                          <a:solidFill>
+                            <a:schemeClr val="bg2">
+                              <a:lumMod val="50000"/>
+                            </a:schemeClr>
+                          </a:solidFill>
                           <a:effectLst/>
                         </a:rPr>
                         <a:t>RowB2</a:t>
@@ -12563,7 +12715,9 @@
                           <a:noFill/>
                         </a:ln>
                         <a:solidFill>
-                          <a:schemeClr val="tx1"/>
+                          <a:schemeClr val="bg2">
+                            <a:lumMod val="50000"/>
+                          </a:schemeClr>
                         </a:solidFill>
                         <a:effectLst/>
                         <a:latin typeface="+mn-lt"/>
@@ -12819,6 +12973,11 @@
                           <a:ln>
                             <a:noFill/>
                           </a:ln>
+                          <a:solidFill>
+                            <a:schemeClr val="bg2">
+                              <a:lumMod val="50000"/>
+                            </a:schemeClr>
+                          </a:solidFill>
                           <a:effectLst/>
                         </a:rPr>
                         <a:t>RowB1</a:t>
@@ -12828,7 +12987,9 @@
                           <a:noFill/>
                         </a:ln>
                         <a:solidFill>
-                          <a:schemeClr val="tx1"/>
+                          <a:schemeClr val="bg2">
+                            <a:lumMod val="50000"/>
+                          </a:schemeClr>
                         </a:solidFill>
                         <a:effectLst/>
                         <a:latin typeface="+mn-lt"/>
@@ -13084,6 +13245,11 @@
                           <a:ln>
                             <a:noFill/>
                           </a:ln>
+                          <a:solidFill>
+                            <a:schemeClr val="bg2">
+                              <a:lumMod val="50000"/>
+                            </a:schemeClr>
+                          </a:solidFill>
                           <a:effectLst/>
                         </a:rPr>
                         <a:t>RowB2</a:t>
@@ -13093,7 +13259,9 @@
                           <a:noFill/>
                         </a:ln>
                         <a:solidFill>
-                          <a:schemeClr val="tx1"/>
+                          <a:schemeClr val="bg2">
+                            <a:lumMod val="50000"/>
+                          </a:schemeClr>
                         </a:solidFill>
                         <a:effectLst/>
                         <a:latin typeface="+mn-lt"/>
@@ -13847,7 +14015,6 @@
               <a:rPr lang="da-DK" smtClean="0"/>
               <a:t>  id</a:t>
             </a:r>
-            <a:endParaRPr lang="da-DK" smtClean="0"/>
           </a:p>
           <a:p>
             <a:r>
@@ -13954,7 +14121,6 @@
               <a:rPr lang="da-DK" smtClean="0"/>
               <a:t>  id</a:t>
             </a:r>
-            <a:endParaRPr lang="da-DK" smtClean="0"/>
           </a:p>
           <a:p>
             <a:r>
@@ -14280,11 +14446,7 @@
             </a:r>
             <a:r>
               <a:rPr lang="da-DK" sz="3200" i="1" smtClean="0"/>
-              <a:t>join </a:t>
-            </a:r>
-            <a:r>
-              <a:rPr lang="da-DK" sz="3200" i="1" smtClean="0"/>
-              <a:t>all three tables unconditionally, and select all columns</a:t>
+              <a:t>join all three tables unconditionally, and select all columns</a:t>
             </a:r>
           </a:p>
           <a:p>
@@ -14610,23 +14772,11 @@
             </a:r>
             <a:r>
               <a:rPr lang="da-DK" sz="3200" i="1"/>
-              <a:t>join all three </a:t>
-            </a:r>
-            <a:r>
-              <a:rPr lang="da-DK" sz="3200" i="1"/>
-              <a:t>tables </a:t>
+              <a:t>join all three tables </a:t>
             </a:r>
             <a:r>
               <a:rPr lang="da-DK" sz="3200" i="1" smtClean="0"/>
-              <a:t>unconditionally, and </a:t>
-            </a:r>
-            <a:r>
-              <a:rPr lang="da-DK" sz="3200" i="1" smtClean="0"/>
-              <a:t>only </a:t>
-            </a:r>
-            <a:r>
-              <a:rPr lang="da-DK" sz="3200" i="1" smtClean="0"/>
-              <a:t>select the relevant columns</a:t>
+              <a:t>unconditionally, and only select the relevant columns</a:t>
             </a:r>
           </a:p>
           <a:p>
@@ -14964,13 +15114,8 @@
             </a:r>
             <a:r>
               <a:rPr lang="da-DK" sz="3200" i="1" smtClean="0"/>
-              <a:t>only select the rows where the relevant key values are </a:t>
-            </a:r>
-            <a:r>
-              <a:rPr lang="da-DK" sz="3200" i="1" smtClean="0"/>
-              <a:t>equal!</a:t>
-            </a:r>
-            <a:endParaRPr lang="da-DK" sz="3200" i="1" smtClean="0"/>
+              <a:t>only select the rows where the relevant key values are equal!</a:t>
+            </a:r>
           </a:p>
           <a:p>
             <a:pPr lvl="0"/>
@@ -15224,15 +15369,7 @@
                   <a:srgbClr val="FF0000"/>
                 </a:solidFill>
               </a:rPr>
-              <a:t>Movie.id </a:t>
-            </a:r>
-            <a:r>
-              <a:rPr lang="da-DK" b="1" smtClean="0">
-                <a:solidFill>
-                  <a:srgbClr val="FF0000"/>
-                </a:solidFill>
-              </a:rPr>
-              <a:t>= Casting.movie_id</a:t>
+              <a:t>Movie.id = Casting.movie_id</a:t>
             </a:r>
             <a:r>
               <a:rPr lang="da-DK" b="1" smtClean="0"/>
@@ -15260,15 +15397,7 @@
                   <a:srgbClr val="FF0000"/>
                 </a:solidFill>
               </a:rPr>
-              <a:t>Actor.id </a:t>
-            </a:r>
-            <a:r>
-              <a:rPr lang="da-DK" b="1" smtClean="0">
-                <a:solidFill>
-                  <a:srgbClr val="FF0000"/>
-                </a:solidFill>
-              </a:rPr>
-              <a:t>= Casting.actor_id</a:t>
+              <a:t>Actor.id = Casting.actor_id</a:t>
             </a:r>
             <a:r>
               <a:rPr lang="da-DK" b="1" smtClean="0"/>

</xml_diff>